<commit_message>
Release VECTO 1.3 - Updated Quick Start Guide - New Welcome Dialog - Updated Demo Data - Update Notes and Support links in Help Menu of Mainform
</commit_message>
<xml_diff>
--- a/User Manual Source/material Quick Start Guide.pptx
+++ b/User Manual Source/material Quick Start Guide.pptx
@@ -316,7 +316,7 @@
           <a:p>
             <a:fld id="{11A2203D-8DA4-4655-BF9E-AA17BDE25312}" type="datetimeFigureOut">
               <a:rPr lang="en-GB" smtClean="0"/>
-              <a:t>09/11/2012</a:t>
+              <a:t>02/05/2013</a:t>
             </a:fld>
             <a:endParaRPr lang="en-GB"/>
           </a:p>
@@ -486,7 +486,7 @@
           <a:p>
             <a:fld id="{11A2203D-8DA4-4655-BF9E-AA17BDE25312}" type="datetimeFigureOut">
               <a:rPr lang="en-GB" smtClean="0"/>
-              <a:t>09/11/2012</a:t>
+              <a:t>02/05/2013</a:t>
             </a:fld>
             <a:endParaRPr lang="en-GB"/>
           </a:p>
@@ -666,7 +666,7 @@
           <a:p>
             <a:fld id="{11A2203D-8DA4-4655-BF9E-AA17BDE25312}" type="datetimeFigureOut">
               <a:rPr lang="en-GB" smtClean="0"/>
-              <a:t>09/11/2012</a:t>
+              <a:t>02/05/2013</a:t>
             </a:fld>
             <a:endParaRPr lang="en-GB"/>
           </a:p>
@@ -836,7 +836,7 @@
           <a:p>
             <a:fld id="{11A2203D-8DA4-4655-BF9E-AA17BDE25312}" type="datetimeFigureOut">
               <a:rPr lang="en-GB" smtClean="0"/>
-              <a:t>09/11/2012</a:t>
+              <a:t>02/05/2013</a:t>
             </a:fld>
             <a:endParaRPr lang="en-GB"/>
           </a:p>
@@ -1082,7 +1082,7 @@
           <a:p>
             <a:fld id="{11A2203D-8DA4-4655-BF9E-AA17BDE25312}" type="datetimeFigureOut">
               <a:rPr lang="en-GB" smtClean="0"/>
-              <a:t>09/11/2012</a:t>
+              <a:t>02/05/2013</a:t>
             </a:fld>
             <a:endParaRPr lang="en-GB"/>
           </a:p>
@@ -1370,7 +1370,7 @@
           <a:p>
             <a:fld id="{11A2203D-8DA4-4655-BF9E-AA17BDE25312}" type="datetimeFigureOut">
               <a:rPr lang="en-GB" smtClean="0"/>
-              <a:t>09/11/2012</a:t>
+              <a:t>02/05/2013</a:t>
             </a:fld>
             <a:endParaRPr lang="en-GB"/>
           </a:p>
@@ -1792,7 +1792,7 @@
           <a:p>
             <a:fld id="{11A2203D-8DA4-4655-BF9E-AA17BDE25312}" type="datetimeFigureOut">
               <a:rPr lang="en-GB" smtClean="0"/>
-              <a:t>09/11/2012</a:t>
+              <a:t>02/05/2013</a:t>
             </a:fld>
             <a:endParaRPr lang="en-GB"/>
           </a:p>
@@ -1910,7 +1910,7 @@
           <a:p>
             <a:fld id="{11A2203D-8DA4-4655-BF9E-AA17BDE25312}" type="datetimeFigureOut">
               <a:rPr lang="en-GB" smtClean="0"/>
-              <a:t>09/11/2012</a:t>
+              <a:t>02/05/2013</a:t>
             </a:fld>
             <a:endParaRPr lang="en-GB"/>
           </a:p>
@@ -2005,7 +2005,7 @@
           <a:p>
             <a:fld id="{11A2203D-8DA4-4655-BF9E-AA17BDE25312}" type="datetimeFigureOut">
               <a:rPr lang="en-GB" smtClean="0"/>
-              <a:t>09/11/2012</a:t>
+              <a:t>02/05/2013</a:t>
             </a:fld>
             <a:endParaRPr lang="en-GB"/>
           </a:p>
@@ -2282,7 +2282,7 @@
           <a:p>
             <a:fld id="{11A2203D-8DA4-4655-BF9E-AA17BDE25312}" type="datetimeFigureOut">
               <a:rPr lang="en-GB" smtClean="0"/>
-              <a:t>09/11/2012</a:t>
+              <a:t>02/05/2013</a:t>
             </a:fld>
             <a:endParaRPr lang="en-GB"/>
           </a:p>
@@ -2535,7 +2535,7 @@
           <a:p>
             <a:fld id="{11A2203D-8DA4-4655-BF9E-AA17BDE25312}" type="datetimeFigureOut">
               <a:rPr lang="en-GB" smtClean="0"/>
-              <a:t>09/11/2012</a:t>
+              <a:t>02/05/2013</a:t>
             </a:fld>
             <a:endParaRPr lang="en-GB"/>
           </a:p>
@@ -2751,7 +2751,7 @@
           <a:p>
             <a:fld id="{11A2203D-8DA4-4655-BF9E-AA17BDE25312}" type="datetimeFigureOut">
               <a:rPr lang="en-GB" smtClean="0"/>
-              <a:t>09/11/2012</a:t>
+              <a:t>02/05/2013</a:t>
             </a:fld>
             <a:endParaRPr lang="en-GB"/>
           </a:p>
@@ -4292,7 +4292,7 @@
       </p:grpSpPr>
       <p:pic>
         <p:nvPicPr>
-          <p:cNvPr id="9218" name="Picture 2"/>
+          <p:cNvPr id="1026" name="Picture 2"/>
           <p:cNvPicPr>
             <a:picLocks noChangeAspect="1" noChangeArrowheads="1"/>
           </p:cNvPicPr>
@@ -4313,8 +4313,8 @@
         </p:blipFill>
         <p:spPr bwMode="auto">
           <a:xfrm>
-            <a:off x="3131840" y="1700808"/>
-            <a:ext cx="2576215" cy="2830029"/>
+            <a:off x="2627784" y="1772816"/>
+            <a:ext cx="2576215" cy="4140155"/>
           </a:xfrm>
           <a:prstGeom prst="rect">
             <a:avLst/>
@@ -4323,7 +4323,6 @@
           <a:ln>
             <a:noFill/>
           </a:ln>
-          <a:effectLst/>
           <a:extLst>
             <a:ext uri="{909E8E84-426E-40DD-AFC4-6F175D3DCCD1}">
               <a14:hiddenFill xmlns:a14="http://schemas.microsoft.com/office/drawing/2010/main">
@@ -4342,15 +4341,6 @@
                 <a:tailEnd/>
               </a14:hiddenLine>
             </a:ext>
-            <a:ext uri="{AF507438-7753-43E0-B8FC-AC1667EBCBE1}">
-              <a14:hiddenEffects xmlns:a14="http://schemas.microsoft.com/office/drawing/2010/main">
-                <a:effectLst>
-                  <a:outerShdw dist="35921" dir="2700000" algn="ctr" rotWithShape="0">
-                    <a:schemeClr val="bg2"/>
-                  </a:outerShdw>
-                </a:effectLst>
-              </a14:hiddenEffects>
-            </a:ext>
           </a:extLst>
         </p:spPr>
       </p:pic>
@@ -4362,8 +4352,8 @@
         </p:nvSpPr>
         <p:spPr>
           <a:xfrm>
-            <a:off x="3131840" y="1700807"/>
-            <a:ext cx="2576215" cy="2830029"/>
+            <a:off x="2627784" y="1772816"/>
+            <a:ext cx="2576215" cy="4140155"/>
           </a:xfrm>
           <a:prstGeom prst="rect">
             <a:avLst/>
@@ -4410,7 +4400,7 @@
         </p:nvSpPr>
         <p:spPr>
           <a:xfrm>
-            <a:off x="3334470" y="1902034"/>
+            <a:off x="2789933" y="1938324"/>
             <a:ext cx="114808" cy="118102"/>
           </a:xfrm>
           <a:prstGeom prst="rect">
@@ -4477,7 +4467,7 @@
         </p:blipFill>
         <p:spPr bwMode="auto">
           <a:xfrm>
-            <a:off x="3329673" y="1959745"/>
+            <a:off x="2785136" y="1996035"/>
             <a:ext cx="207665" cy="179976"/>
           </a:xfrm>
           <a:prstGeom prst="rect">
@@ -4548,7 +4538,7 @@
       </p:grpSpPr>
       <p:pic>
         <p:nvPicPr>
-          <p:cNvPr id="1026" name="Picture 2"/>
+          <p:cNvPr id="2050" name="Picture 2"/>
           <p:cNvPicPr>
             <a:picLocks noChangeAspect="1" noChangeArrowheads="1"/>
           </p:cNvPicPr>
@@ -4569,8 +4559,8 @@
         </p:blipFill>
         <p:spPr bwMode="auto">
           <a:xfrm>
-            <a:off x="3131841" y="1701180"/>
-            <a:ext cx="2576214" cy="2801868"/>
+            <a:off x="3131841" y="1701181"/>
+            <a:ext cx="2576213" cy="4140150"/>
           </a:xfrm>
           <a:prstGeom prst="rect">
             <a:avLst/>
@@ -4579,7 +4569,6 @@
           <a:ln>
             <a:noFill/>
           </a:ln>
-          <a:effectLst/>
           <a:extLst>
             <a:ext uri="{909E8E84-426E-40DD-AFC4-6F175D3DCCD1}">
               <a14:hiddenFill xmlns:a14="http://schemas.microsoft.com/office/drawing/2010/main">
@@ -4598,15 +4587,6 @@
                 <a:tailEnd/>
               </a14:hiddenLine>
             </a:ext>
-            <a:ext uri="{AF507438-7753-43E0-B8FC-AC1667EBCBE1}">
-              <a14:hiddenEffects xmlns:a14="http://schemas.microsoft.com/office/drawing/2010/main">
-                <a:effectLst>
-                  <a:outerShdw dist="35921" dir="2700000" algn="ctr" rotWithShape="0">
-                    <a:schemeClr val="bg2"/>
-                  </a:outerShdw>
-                </a:effectLst>
-              </a14:hiddenEffects>
-            </a:ext>
           </a:extLst>
         </p:spPr>
       </p:pic>
@@ -4618,8 +4598,8 @@
         </p:nvSpPr>
         <p:spPr>
           <a:xfrm>
-            <a:off x="3908190" y="2802510"/>
-            <a:ext cx="860660" cy="921765"/>
+            <a:off x="3854096" y="2637663"/>
+            <a:ext cx="1627541" cy="753237"/>
           </a:xfrm>
           <a:prstGeom prst="rect">
             <a:avLst/>
@@ -4670,8 +4650,8 @@
         </p:nvSpPr>
         <p:spPr>
           <a:xfrm>
-            <a:off x="4478293" y="2594230"/>
-            <a:ext cx="1084434" cy="157733"/>
+            <a:off x="4667866" y="3442644"/>
+            <a:ext cx="934768" cy="135581"/>
           </a:xfrm>
           <a:prstGeom prst="rect">
             <a:avLst/>
@@ -4722,8 +4702,8 @@
         </p:nvSpPr>
         <p:spPr>
           <a:xfrm>
-            <a:off x="4606691" y="4160838"/>
-            <a:ext cx="454259" cy="122395"/>
+            <a:off x="4768850" y="5545138"/>
+            <a:ext cx="400050" cy="122395"/>
           </a:xfrm>
           <a:prstGeom prst="rect">
             <a:avLst/>
@@ -4789,7 +4769,7 @@
         </p:blipFill>
         <p:spPr bwMode="auto">
           <a:xfrm>
-            <a:off x="4845348" y="4213948"/>
+            <a:off x="4953298" y="5598248"/>
             <a:ext cx="207665" cy="179976"/>
           </a:xfrm>
           <a:prstGeom prst="rect">
@@ -4828,6 +4808,58 @@
           </a:extLst>
         </p:spPr>
       </p:pic>
+      <p:sp>
+        <p:nvSpPr>
+          <p:cNvPr id="10" name="Rechteck 9"/>
+          <p:cNvSpPr/>
+          <p:nvPr/>
+        </p:nvSpPr>
+        <p:spPr>
+          <a:xfrm>
+            <a:off x="3220066" y="3603625"/>
+            <a:ext cx="2382568" cy="1841599"/>
+          </a:xfrm>
+          <a:prstGeom prst="rect">
+            <a:avLst/>
+          </a:prstGeom>
+          <a:solidFill>
+            <a:schemeClr val="accent1">
+              <a:lumMod val="20000"/>
+              <a:lumOff val="80000"/>
+              <a:alpha val="50196"/>
+            </a:schemeClr>
+          </a:solidFill>
+          <a:ln w="9525">
+            <a:solidFill>
+              <a:schemeClr val="accent1"/>
+            </a:solidFill>
+          </a:ln>
+        </p:spPr>
+        <p:style>
+          <a:lnRef idx="2">
+            <a:schemeClr val="accent1">
+              <a:shade val="50000"/>
+            </a:schemeClr>
+          </a:lnRef>
+          <a:fillRef idx="1">
+            <a:schemeClr val="accent1"/>
+          </a:fillRef>
+          <a:effectRef idx="0">
+            <a:schemeClr val="accent1"/>
+          </a:effectRef>
+          <a:fontRef idx="minor">
+            <a:schemeClr val="lt1"/>
+          </a:fontRef>
+        </p:style>
+        <p:txBody>
+          <a:bodyPr rtlCol="0" anchor="ctr"/>
+          <a:lstStyle/>
+          <a:p>
+            <a:pPr algn="ctr"/>
+            <a:endParaRPr lang="en-GB"/>
+          </a:p>
+        </p:txBody>
+      </p:sp>
     </p:spTree>
     <p:extLst>
       <p:ext uri="{BB962C8B-B14F-4D97-AF65-F5344CB8AC3E}">
@@ -7595,7 +7627,7 @@
       </p:grpSpPr>
       <p:pic>
         <p:nvPicPr>
-          <p:cNvPr id="1026" name="Picture 2"/>
+          <p:cNvPr id="3075" name="Picture 3"/>
           <p:cNvPicPr>
             <a:picLocks noChangeAspect="1" noChangeArrowheads="1"/>
           </p:cNvPicPr>
@@ -7616,8 +7648,8 @@
         </p:blipFill>
         <p:spPr bwMode="auto">
           <a:xfrm>
-            <a:off x="2699792" y="1772816"/>
-            <a:ext cx="3457786" cy="3163722"/>
+            <a:off x="611560" y="1682828"/>
+            <a:ext cx="3457785" cy="3402096"/>
           </a:xfrm>
           <a:prstGeom prst="rect">
             <a:avLst/>
@@ -7626,7 +7658,6 @@
           <a:ln>
             <a:noFill/>
           </a:ln>
-          <a:effectLst/>
           <a:extLst>
             <a:ext uri="{909E8E84-426E-40DD-AFC4-6F175D3DCCD1}">
               <a14:hiddenFill xmlns:a14="http://schemas.microsoft.com/office/drawing/2010/main">
@@ -7645,15 +7676,6 @@
                 <a:tailEnd/>
               </a14:hiddenLine>
             </a:ext>
-            <a:ext uri="{AF507438-7753-43E0-B8FC-AC1667EBCBE1}">
-              <a14:hiddenEffects xmlns:a14="http://schemas.microsoft.com/office/drawing/2010/main">
-                <a:effectLst>
-                  <a:outerShdw dist="35921" dir="2700000" algn="ctr" rotWithShape="0">
-                    <a:schemeClr val="bg2"/>
-                  </a:outerShdw>
-                </a:effectLst>
-              </a14:hiddenEffects>
-            </a:ext>
           </a:extLst>
         </p:spPr>
       </p:pic>
@@ -7665,8 +7687,8 @@
         </p:nvSpPr>
         <p:spPr>
           <a:xfrm>
-            <a:off x="2699792" y="1772816"/>
-            <a:ext cx="3457786" cy="3117769"/>
+            <a:off x="611560" y="1682828"/>
+            <a:ext cx="3457786" cy="3402096"/>
           </a:xfrm>
           <a:prstGeom prst="rect">
             <a:avLst/>
@@ -7713,7 +7735,7 @@
         </p:nvSpPr>
         <p:spPr>
           <a:xfrm>
-            <a:off x="5286374" y="4662488"/>
+            <a:off x="3198142" y="4807450"/>
             <a:ext cx="371475" cy="112712"/>
           </a:xfrm>
           <a:prstGeom prst="rect">
@@ -7780,7 +7802,7 @@
         </p:blipFill>
         <p:spPr bwMode="auto">
           <a:xfrm>
-            <a:off x="5509642" y="4710609"/>
+            <a:off x="3421410" y="4855571"/>
             <a:ext cx="207665" cy="179976"/>
           </a:xfrm>
           <a:prstGeom prst="rect">
@@ -7827,7 +7849,7 @@
         </p:nvSpPr>
         <p:spPr>
           <a:xfrm>
-            <a:off x="3238500" y="2290763"/>
+            <a:off x="1131218" y="2365875"/>
             <a:ext cx="533400" cy="128587"/>
           </a:xfrm>
           <a:prstGeom prst="rect">
@@ -7879,7 +7901,7 @@
         </p:nvSpPr>
         <p:spPr>
           <a:xfrm>
-            <a:off x="5880100" y="2557463"/>
+            <a:off x="3626768" y="2632575"/>
             <a:ext cx="146050" cy="104775"/>
           </a:xfrm>
           <a:prstGeom prst="rect">
@@ -7931,8 +7953,8 @@
         </p:nvSpPr>
         <p:spPr>
           <a:xfrm>
-            <a:off x="2804567" y="2754216"/>
-            <a:ext cx="981621" cy="703359"/>
+            <a:off x="721097" y="2883304"/>
+            <a:ext cx="1922091" cy="479022"/>
           </a:xfrm>
           <a:prstGeom prst="rect">
             <a:avLst/>
@@ -7947,6 +7969,110 @@
           <a:ln w="9525">
             <a:solidFill>
               <a:schemeClr val="accent1"/>
+            </a:solidFill>
+          </a:ln>
+        </p:spPr>
+        <p:style>
+          <a:lnRef idx="2">
+            <a:schemeClr val="accent1">
+              <a:shade val="50000"/>
+            </a:schemeClr>
+          </a:lnRef>
+          <a:fillRef idx="1">
+            <a:schemeClr val="accent1"/>
+          </a:fillRef>
+          <a:effectRef idx="0">
+            <a:schemeClr val="accent1"/>
+          </a:effectRef>
+          <a:fontRef idx="minor">
+            <a:schemeClr val="lt1"/>
+          </a:fontRef>
+        </p:style>
+        <p:txBody>
+          <a:bodyPr rtlCol="0" anchor="ctr"/>
+          <a:lstStyle/>
+          <a:p>
+            <a:pPr algn="ctr"/>
+            <a:endParaRPr lang="en-GB"/>
+          </a:p>
+        </p:txBody>
+      </p:sp>
+      <p:sp>
+        <p:nvSpPr>
+          <p:cNvPr id="12" name="Rechteck 11"/>
+          <p:cNvSpPr/>
+          <p:nvPr/>
+        </p:nvSpPr>
+        <p:spPr>
+          <a:xfrm>
+            <a:off x="721098" y="4150131"/>
+            <a:ext cx="1922090" cy="479022"/>
+          </a:xfrm>
+          <a:prstGeom prst="rect">
+            <a:avLst/>
+          </a:prstGeom>
+          <a:solidFill>
+            <a:schemeClr val="accent1">
+              <a:lumMod val="20000"/>
+              <a:lumOff val="80000"/>
+              <a:alpha val="50196"/>
+            </a:schemeClr>
+          </a:solidFill>
+          <a:ln w="9525">
+            <a:solidFill>
+              <a:schemeClr val="accent1"/>
+            </a:solidFill>
+          </a:ln>
+        </p:spPr>
+        <p:style>
+          <a:lnRef idx="2">
+            <a:schemeClr val="accent1">
+              <a:shade val="50000"/>
+            </a:schemeClr>
+          </a:lnRef>
+          <a:fillRef idx="1">
+            <a:schemeClr val="accent1"/>
+          </a:fillRef>
+          <a:effectRef idx="0">
+            <a:schemeClr val="accent1"/>
+          </a:effectRef>
+          <a:fontRef idx="minor">
+            <a:schemeClr val="lt1"/>
+          </a:fontRef>
+        </p:style>
+        <p:txBody>
+          <a:bodyPr rtlCol="0" anchor="ctr"/>
+          <a:lstStyle/>
+          <a:p>
+            <a:pPr algn="ctr"/>
+            <a:endParaRPr lang="en-GB"/>
+          </a:p>
+        </p:txBody>
+      </p:sp>
+      <p:sp>
+        <p:nvSpPr>
+          <p:cNvPr id="13" name="Rechteck 12"/>
+          <p:cNvSpPr/>
+          <p:nvPr/>
+        </p:nvSpPr>
+        <p:spPr>
+          <a:xfrm>
+            <a:off x="721098" y="3451725"/>
+            <a:ext cx="1922090" cy="553339"/>
+          </a:xfrm>
+          <a:prstGeom prst="rect">
+            <a:avLst/>
+          </a:prstGeom>
+          <a:solidFill>
+            <a:schemeClr val="accent2">
+              <a:lumMod val="20000"/>
+              <a:lumOff val="80000"/>
+              <a:alpha val="50196"/>
+            </a:schemeClr>
+          </a:solidFill>
+          <a:ln w="9525">
+            <a:solidFill>
+              <a:srgbClr val="FF0000"/>
             </a:solidFill>
           </a:ln>
         </p:spPr>
@@ -8717,14 +8843,270 @@
       </p:grpSpPr>
       <p:pic>
         <p:nvPicPr>
-          <p:cNvPr id="5122" name="Picture 2"/>
+          <p:cNvPr id="1026" name="Picture 2"/>
           <p:cNvPicPr>
             <a:picLocks noChangeAspect="1" noChangeArrowheads="1"/>
           </p:cNvPicPr>
           <p:nvPr/>
         </p:nvPicPr>
+        <p:blipFill rotWithShape="1">
+          <a:blip r:embed="rId2" cstate="print">
+            <a:extLst>
+              <a:ext uri="{28A0092B-C50C-407E-A947-70E740481C1C}">
+                <a14:useLocalDpi xmlns:a14="http://schemas.microsoft.com/office/drawing/2010/main" val="0"/>
+              </a:ext>
+            </a:extLst>
+          </a:blip>
+          <a:srcRect l="24567" t="12000" r="15461" b="31732"/>
+          <a:stretch/>
+        </p:blipFill>
+        <p:spPr bwMode="auto">
+          <a:xfrm>
+            <a:off x="827584" y="1412776"/>
+            <a:ext cx="4667901" cy="2737154"/>
+          </a:xfrm>
+          <a:prstGeom prst="rect">
+            <a:avLst/>
+          </a:prstGeom>
+          <a:noFill/>
+          <a:ln>
+            <a:noFill/>
+          </a:ln>
+          <a:extLst>
+            <a:ext uri="{909E8E84-426E-40DD-AFC4-6F175D3DCCD1}">
+              <a14:hiddenFill xmlns:a14="http://schemas.microsoft.com/office/drawing/2010/main">
+                <a:solidFill>
+                  <a:schemeClr val="accent1"/>
+                </a:solidFill>
+              </a14:hiddenFill>
+            </a:ext>
+            <a:ext uri="{91240B29-F687-4F45-9708-019B960494DF}">
+              <a14:hiddenLine xmlns:a14="http://schemas.microsoft.com/office/drawing/2010/main" w="9525">
+                <a:solidFill>
+                  <a:schemeClr val="tx1"/>
+                </a:solidFill>
+                <a:miter lim="800000"/>
+                <a:headEnd/>
+                <a:tailEnd/>
+              </a14:hiddenLine>
+            </a:ext>
+          </a:extLst>
+        </p:spPr>
+      </p:pic>
+      <p:sp>
+        <p:nvSpPr>
+          <p:cNvPr id="4" name="Rechteck 3"/>
+          <p:cNvSpPr/>
+          <p:nvPr/>
+        </p:nvSpPr>
+        <p:spPr>
+          <a:xfrm>
+            <a:off x="827584" y="1412776"/>
+            <a:ext cx="4667901" cy="2737154"/>
+          </a:xfrm>
+          <a:prstGeom prst="rect">
+            <a:avLst/>
+          </a:prstGeom>
+          <a:solidFill>
+            <a:srgbClr val="FFFFFF">
+              <a:alpha val="40000"/>
+            </a:srgbClr>
+          </a:solidFill>
+          <a:ln>
+            <a:noFill/>
+          </a:ln>
+        </p:spPr>
+        <p:style>
+          <a:lnRef idx="2">
+            <a:schemeClr val="accent1">
+              <a:shade val="50000"/>
+            </a:schemeClr>
+          </a:lnRef>
+          <a:fillRef idx="1">
+            <a:schemeClr val="accent1"/>
+          </a:fillRef>
+          <a:effectRef idx="0">
+            <a:schemeClr val="accent1"/>
+          </a:effectRef>
+          <a:fontRef idx="minor">
+            <a:schemeClr val="lt1"/>
+          </a:fontRef>
+        </p:style>
+        <p:txBody>
+          <a:bodyPr rtlCol="0" anchor="ctr"/>
+          <a:lstStyle/>
+          <a:p>
+            <a:pPr algn="ctr"/>
+            <a:endParaRPr lang="en-GB"/>
+          </a:p>
+        </p:txBody>
+      </p:sp>
+      <p:pic>
+        <p:nvPicPr>
+          <p:cNvPr id="5" name="Picture 2"/>
+          <p:cNvPicPr>
+            <a:picLocks noChangeAspect="1" noChangeArrowheads="1"/>
+          </p:cNvPicPr>
+          <p:nvPr/>
+        </p:nvPicPr>
+        <p:blipFill rotWithShape="1">
+          <a:blip r:embed="rId2" cstate="print">
+            <a:extLst>
+              <a:ext uri="{28A0092B-C50C-407E-A947-70E740481C1C}">
+                <a14:useLocalDpi xmlns:a14="http://schemas.microsoft.com/office/drawing/2010/main" val="0"/>
+              </a:ext>
+            </a:extLst>
+          </a:blip>
+          <a:srcRect l="48239" t="60150" r="42501" b="34172"/>
+          <a:stretch/>
+        </p:blipFill>
+        <p:spPr bwMode="auto">
+          <a:xfrm>
+            <a:off x="2672740" y="3752626"/>
+            <a:ext cx="720725" cy="276225"/>
+          </a:xfrm>
+          <a:prstGeom prst="rect">
+            <a:avLst/>
+          </a:prstGeom>
+          <a:noFill/>
+          <a:ln>
+            <a:noFill/>
+          </a:ln>
+          <a:extLst>
+            <a:ext uri="{909E8E84-426E-40DD-AFC4-6F175D3DCCD1}">
+              <a14:hiddenFill xmlns:a14="http://schemas.microsoft.com/office/drawing/2010/main">
+                <a:solidFill>
+                  <a:schemeClr val="accent1"/>
+                </a:solidFill>
+              </a14:hiddenFill>
+            </a:ext>
+            <a:ext uri="{91240B29-F687-4F45-9708-019B960494DF}">
+              <a14:hiddenLine xmlns:a14="http://schemas.microsoft.com/office/drawing/2010/main" w="9525">
+                <a:solidFill>
+                  <a:schemeClr val="tx1"/>
+                </a:solidFill>
+                <a:miter lim="800000"/>
+                <a:headEnd/>
+                <a:tailEnd/>
+              </a14:hiddenLine>
+            </a:ext>
+          </a:extLst>
+        </p:spPr>
+      </p:pic>
+      <p:sp>
+        <p:nvSpPr>
+          <p:cNvPr id="9" name="Pfeil nach rechts 8"/>
+          <p:cNvSpPr/>
+          <p:nvPr/>
+        </p:nvSpPr>
+        <p:spPr bwMode="auto">
+          <a:xfrm>
+            <a:off x="3563888" y="3417945"/>
+            <a:ext cx="869032" cy="715532"/>
+          </a:xfrm>
+          <a:prstGeom prst="rightArrow">
+            <a:avLst>
+              <a:gd name="adj1" fmla="val 50000"/>
+              <a:gd name="adj2" fmla="val 60960"/>
+            </a:avLst>
+          </a:prstGeom>
+          <a:solidFill>
+            <a:srgbClr val="C00000"/>
+          </a:solidFill>
+          <a:ln w="38100" cap="flat" cmpd="sng" algn="ctr">
+            <a:solidFill>
+              <a:srgbClr val="C00000"/>
+            </a:solidFill>
+            <a:prstDash val="solid"/>
+            <a:round/>
+            <a:headEnd type="none" w="med" len="med"/>
+            <a:tailEnd type="triangle" w="med" len="med"/>
+          </a:ln>
+          <a:effectLst/>
+          <a:extLst/>
+        </p:spPr>
+        <p:txBody>
+          <a:bodyPr vert="horz" wrap="square" lIns="91440" tIns="45720" rIns="91440" bIns="45720" numCol="1" rtlCol="0" anchor="ctr" anchorCtr="0" compatLnSpc="1">
+            <a:prstTxWarp prst="textNoShape">
+              <a:avLst/>
+            </a:prstTxWarp>
+            <a:noAutofit/>
+          </a:bodyPr>
+          <a:lstStyle/>
+          <a:p>
+            <a:pPr>
+              <a:spcBef>
+                <a:spcPct val="30000"/>
+              </a:spcBef>
+            </a:pPr>
+            <a:endParaRPr lang="en-GB" sz="2000">
+              <a:latin typeface="Arial" pitchFamily="34" charset="0"/>
+            </a:endParaRPr>
+          </a:p>
+        </p:txBody>
+      </p:sp>
+      <p:sp>
+        <p:nvSpPr>
+          <p:cNvPr id="10" name="Rechteck 9"/>
+          <p:cNvSpPr/>
+          <p:nvPr/>
+        </p:nvSpPr>
+        <p:spPr>
+          <a:xfrm>
+            <a:off x="2667000" y="3732387"/>
+            <a:ext cx="730250" cy="128414"/>
+          </a:xfrm>
+          <a:prstGeom prst="rect">
+            <a:avLst/>
+          </a:prstGeom>
+          <a:solidFill>
+            <a:schemeClr val="accent2">
+              <a:lumMod val="20000"/>
+              <a:lumOff val="80000"/>
+              <a:alpha val="50196"/>
+            </a:schemeClr>
+          </a:solidFill>
+          <a:ln w="9525">
+            <a:solidFill>
+              <a:srgbClr val="FF0000"/>
+            </a:solidFill>
+          </a:ln>
+        </p:spPr>
+        <p:style>
+          <a:lnRef idx="2">
+            <a:schemeClr val="accent1">
+              <a:shade val="50000"/>
+            </a:schemeClr>
+          </a:lnRef>
+          <a:fillRef idx="1">
+            <a:schemeClr val="accent1"/>
+          </a:fillRef>
+          <a:effectRef idx="0">
+            <a:schemeClr val="accent1"/>
+          </a:effectRef>
+          <a:fontRef idx="minor">
+            <a:schemeClr val="lt1"/>
+          </a:fontRef>
+        </p:style>
+        <p:txBody>
+          <a:bodyPr rtlCol="0" anchor="ctr"/>
+          <a:lstStyle/>
+          <a:p>
+            <a:pPr algn="ctr"/>
+            <a:endParaRPr lang="en-GB"/>
+          </a:p>
+        </p:txBody>
+      </p:sp>
+      <p:pic>
+        <p:nvPicPr>
+          <p:cNvPr id="7" name="Picture 8"/>
+          <p:cNvPicPr>
+            <a:picLocks noChangeAspect="1" noChangeArrowheads="1"/>
+          </p:cNvPicPr>
+          <p:nvPr/>
+        </p:nvPicPr>
         <p:blipFill>
-          <a:blip r:embed="rId2">
+          <a:blip r:embed="rId3">
             <a:extLst>
               <a:ext uri="{28A0092B-C50C-407E-A947-70E740481C1C}">
                 <a14:useLocalDpi xmlns:a14="http://schemas.microsoft.com/office/drawing/2010/main" val="0"/>
@@ -8738,8 +9120,8 @@
         </p:blipFill>
         <p:spPr bwMode="auto">
           <a:xfrm>
-            <a:off x="2028169" y="1628800"/>
-            <a:ext cx="4430241" cy="2737155"/>
+            <a:off x="3252292" y="3785526"/>
+            <a:ext cx="207665" cy="179976"/>
           </a:xfrm>
           <a:prstGeom prst="rect">
             <a:avLst/>
@@ -8748,7 +9130,14 @@
           <a:ln>
             <a:noFill/>
           </a:ln>
-          <a:effectLst/>
+          <a:effectLst>
+            <a:outerShdw blurRad="50800" dist="38100" dir="2700000" algn="tl" rotWithShape="0">
+              <a:prstClr val="black">
+                <a:alpha val="40000"/>
+              </a:prstClr>
+            </a:outerShdw>
+            <a:softEdge rad="0"/>
+          </a:effectLst>
           <a:extLst>
             <a:ext uri="{909E8E84-426E-40DD-AFC4-6F175D3DCCD1}">
               <a14:hiddenFill xmlns:a14="http://schemas.microsoft.com/office/drawing/2010/main">
@@ -8767,14 +9156,173 @@
                 <a:tailEnd/>
               </a14:hiddenLine>
             </a:ext>
-            <a:ext uri="{AF507438-7753-43E0-B8FC-AC1667EBCBE1}">
-              <a14:hiddenEffects xmlns:a14="http://schemas.microsoft.com/office/drawing/2010/main">
-                <a:effectLst>
-                  <a:outerShdw dist="35921" dir="2700000" algn="ctr" rotWithShape="0">
-                    <a:schemeClr val="bg2"/>
-                  </a:outerShdw>
-                </a:effectLst>
-              </a14:hiddenEffects>
+          </a:extLst>
+        </p:spPr>
+      </p:pic>
+      <p:pic>
+        <p:nvPicPr>
+          <p:cNvPr id="1028" name="Picture 4"/>
+          <p:cNvPicPr>
+            <a:picLocks noChangeAspect="1" noChangeArrowheads="1"/>
+          </p:cNvPicPr>
+          <p:nvPr/>
+        </p:nvPicPr>
+        <p:blipFill>
+          <a:blip r:embed="rId4" cstate="print">
+            <a:extLst>
+              <a:ext uri="{28A0092B-C50C-407E-A947-70E740481C1C}">
+                <a14:useLocalDpi xmlns:a14="http://schemas.microsoft.com/office/drawing/2010/main" val="0"/>
+              </a:ext>
+            </a:extLst>
+          </a:blip>
+          <a:srcRect/>
+          <a:stretch>
+            <a:fillRect/>
+          </a:stretch>
+        </p:blipFill>
+        <p:spPr bwMode="auto">
+          <a:xfrm>
+            <a:off x="4499992" y="2606953"/>
+            <a:ext cx="3839791" cy="1974175"/>
+          </a:xfrm>
+          <a:prstGeom prst="rect">
+            <a:avLst/>
+          </a:prstGeom>
+          <a:noFill/>
+          <a:ln>
+            <a:noFill/>
+          </a:ln>
+          <a:extLst>
+            <a:ext uri="{909E8E84-426E-40DD-AFC4-6F175D3DCCD1}">
+              <a14:hiddenFill xmlns:a14="http://schemas.microsoft.com/office/drawing/2010/main">
+                <a:solidFill>
+                  <a:schemeClr val="accent1"/>
+                </a:solidFill>
+              </a14:hiddenFill>
+            </a:ext>
+            <a:ext uri="{91240B29-F687-4F45-9708-019B960494DF}">
+              <a14:hiddenLine xmlns:a14="http://schemas.microsoft.com/office/drawing/2010/main" w="9525">
+                <a:solidFill>
+                  <a:schemeClr val="tx1"/>
+                </a:solidFill>
+                <a:miter lim="800000"/>
+                <a:headEnd/>
+                <a:tailEnd/>
+              </a14:hiddenLine>
+            </a:ext>
+          </a:extLst>
+        </p:spPr>
+      </p:pic>
+      <p:sp>
+        <p:nvSpPr>
+          <p:cNvPr id="11" name="Rechteck 10"/>
+          <p:cNvSpPr/>
+          <p:nvPr/>
+        </p:nvSpPr>
+        <p:spPr>
+          <a:xfrm>
+            <a:off x="7317482" y="2837283"/>
+            <a:ext cx="747018" cy="758461"/>
+          </a:xfrm>
+          <a:prstGeom prst="rect">
+            <a:avLst/>
+          </a:prstGeom>
+          <a:solidFill>
+            <a:schemeClr val="accent2">
+              <a:lumMod val="20000"/>
+              <a:lumOff val="80000"/>
+              <a:alpha val="50196"/>
+            </a:schemeClr>
+          </a:solidFill>
+          <a:ln w="9525">
+            <a:solidFill>
+              <a:srgbClr val="FF0000"/>
+            </a:solidFill>
+          </a:ln>
+        </p:spPr>
+        <p:style>
+          <a:lnRef idx="2">
+            <a:schemeClr val="accent1">
+              <a:shade val="50000"/>
+            </a:schemeClr>
+          </a:lnRef>
+          <a:fillRef idx="1">
+            <a:schemeClr val="accent1"/>
+          </a:fillRef>
+          <a:effectRef idx="0">
+            <a:schemeClr val="accent1"/>
+          </a:effectRef>
+          <a:fontRef idx="minor">
+            <a:schemeClr val="lt1"/>
+          </a:fontRef>
+        </p:style>
+        <p:txBody>
+          <a:bodyPr rtlCol="0" anchor="ctr"/>
+          <a:lstStyle/>
+          <a:p>
+            <a:pPr algn="ctr"/>
+            <a:endParaRPr lang="en-GB"/>
+          </a:p>
+        </p:txBody>
+      </p:sp>
+      <p:pic>
+        <p:nvPicPr>
+          <p:cNvPr id="12" name="Picture 8"/>
+          <p:cNvPicPr>
+            <a:picLocks noChangeAspect="1" noChangeArrowheads="1"/>
+          </p:cNvPicPr>
+          <p:nvPr/>
+        </p:nvPicPr>
+        <p:blipFill>
+          <a:blip r:embed="rId3">
+            <a:extLst>
+              <a:ext uri="{28A0092B-C50C-407E-A947-70E740481C1C}">
+                <a14:useLocalDpi xmlns:a14="http://schemas.microsoft.com/office/drawing/2010/main" val="0"/>
+              </a:ext>
+            </a:extLst>
+          </a:blip>
+          <a:srcRect/>
+          <a:stretch>
+            <a:fillRect/>
+          </a:stretch>
+        </p:blipFill>
+        <p:spPr bwMode="auto">
+          <a:xfrm>
+            <a:off x="7943898" y="3499631"/>
+            <a:ext cx="207665" cy="179976"/>
+          </a:xfrm>
+          <a:prstGeom prst="rect">
+            <a:avLst/>
+          </a:prstGeom>
+          <a:noFill/>
+          <a:ln>
+            <a:noFill/>
+          </a:ln>
+          <a:effectLst>
+            <a:outerShdw blurRad="50800" dist="38100" dir="2700000" algn="tl" rotWithShape="0">
+              <a:prstClr val="black">
+                <a:alpha val="40000"/>
+              </a:prstClr>
+            </a:outerShdw>
+            <a:softEdge rad="0"/>
+          </a:effectLst>
+          <a:extLst>
+            <a:ext uri="{909E8E84-426E-40DD-AFC4-6F175D3DCCD1}">
+              <a14:hiddenFill xmlns:a14="http://schemas.microsoft.com/office/drawing/2010/main">
+                <a:solidFill>
+                  <a:schemeClr val="accent1"/>
+                </a:solidFill>
+              </a14:hiddenFill>
+            </a:ext>
+            <a:ext uri="{91240B29-F687-4F45-9708-019B960494DF}">
+              <a14:hiddenLine xmlns:a14="http://schemas.microsoft.com/office/drawing/2010/main" w="9525">
+                <a:solidFill>
+                  <a:schemeClr val="tx1"/>
+                </a:solidFill>
+                <a:miter lim="800000"/>
+                <a:headEnd/>
+                <a:tailEnd/>
+              </a14:hiddenLine>
             </a:ext>
           </a:extLst>
         </p:spPr>

</xml_diff>